<commit_message>
Chenged User Guide Templates and Markdown
</commit_message>
<xml_diff>
--- a/assets/ppt_templates/UserGuideTemplate.pptx
+++ b/assets/ppt_templates/UserGuideTemplate.pptx
@@ -2794,7 +2794,7 @@
           </a:bodyPr>
           <a:lstStyle>
             <a:lvl1pPr algn="l">
-              <a:defRPr sz="4000"/>
+              <a:defRPr sz="3600"/>
             </a:lvl1pPr>
           </a:lstStyle>
           <a:p>
@@ -2827,19 +2827,19 @@
           </a:bodyPr>
           <a:lstStyle>
             <a:lvl1pPr>
-              <a:defRPr sz="2800"/>
+              <a:defRPr sz="2000"/>
             </a:lvl1pPr>
             <a:lvl2pPr>
-              <a:defRPr sz="2400"/>
+              <a:defRPr sz="1800"/>
             </a:lvl2pPr>
             <a:lvl3pPr>
-              <a:defRPr sz="2000"/>
+              <a:defRPr sz="1600"/>
             </a:lvl3pPr>
             <a:lvl4pPr>
-              <a:defRPr sz="1800"/>
+              <a:defRPr sz="1400"/>
             </a:lvl4pPr>
             <a:lvl5pPr>
-              <a:defRPr sz="1800"/>
+              <a:defRPr sz="1400"/>
             </a:lvl5pPr>
           </a:lstStyle>
           <a:p>
@@ -3478,7 +3478,7 @@
           </a:bodyPr>
           <a:lstStyle>
             <a:lvl1pPr algn="l">
-              <a:defRPr sz="4000"/>
+              <a:defRPr sz="3600"/>
             </a:lvl1pPr>
           </a:lstStyle>
           <a:p>
@@ -3511,19 +3511,19 @@
           </a:bodyPr>
           <a:lstStyle>
             <a:lvl1pPr>
-              <a:defRPr sz="2800"/>
+              <a:defRPr sz="2000"/>
             </a:lvl1pPr>
             <a:lvl2pPr>
-              <a:defRPr sz="2400"/>
+              <a:defRPr sz="1800"/>
             </a:lvl2pPr>
             <a:lvl3pPr>
-              <a:defRPr sz="2000"/>
+              <a:defRPr sz="1600"/>
             </a:lvl3pPr>
             <a:lvl4pPr>
-              <a:defRPr sz="1800"/>
+              <a:defRPr sz="1400"/>
             </a:lvl4pPr>
             <a:lvl5pPr>
-              <a:defRPr sz="1800"/>
+              <a:defRPr sz="1400"/>
             </a:lvl5pPr>
           </a:lstStyle>
           <a:p>
@@ -3591,19 +3591,19 @@
           </a:bodyPr>
           <a:lstStyle>
             <a:lvl1pPr>
-              <a:defRPr sz="2800"/>
+              <a:defRPr sz="2000"/>
             </a:lvl1pPr>
             <a:lvl2pPr>
-              <a:defRPr sz="2400"/>
+              <a:defRPr sz="1800"/>
             </a:lvl2pPr>
             <a:lvl3pPr>
-              <a:defRPr sz="2000"/>
+              <a:defRPr sz="1600"/>
             </a:lvl3pPr>
             <a:lvl4pPr>
-              <a:defRPr sz="1800"/>
+              <a:defRPr sz="1400"/>
             </a:lvl4pPr>
             <a:lvl5pPr>
-              <a:defRPr sz="1800"/>
+              <a:defRPr sz="1400"/>
             </a:lvl5pPr>
           </a:lstStyle>
           <a:p>
@@ -3698,7 +3698,7 @@
           </a:bodyPr>
           <a:lstStyle>
             <a:lvl1pPr algn="l">
-              <a:defRPr sz="4000"/>
+              <a:defRPr sz="3600"/>
             </a:lvl1pPr>
           </a:lstStyle>
           <a:p>
@@ -3731,53 +3731,53 @@
           </a:bodyPr>
           <a:lstStyle>
             <a:lvl1pPr>
-              <a:defRPr sz="2800"/>
+              <a:defRPr sz="2000"/>
             </a:lvl1pPr>
             <a:lvl2pPr>
-              <a:defRPr sz="2400"/>
+              <a:defRPr sz="1800"/>
             </a:lvl2pPr>
             <a:lvl3pPr>
-              <a:defRPr sz="2000"/>
+              <a:defRPr sz="1600"/>
             </a:lvl3pPr>
             <a:lvl4pPr>
-              <a:defRPr sz="1800"/>
+              <a:defRPr sz="1400"/>
             </a:lvl4pPr>
             <a:lvl5pPr>
-              <a:defRPr sz="1800"/>
+              <a:defRPr sz="1400"/>
             </a:lvl5pPr>
           </a:lstStyle>
           <a:p>
             <a:pPr lvl="0"/>
             <a:r>
-              <a:rPr lang="en-US"/>
+              <a:rPr lang="en-US" dirty="0"/>
               <a:t>Click to edit Master text styles</a:t>
             </a:r>
           </a:p>
           <a:p>
             <a:pPr lvl="1"/>
             <a:r>
-              <a:rPr lang="en-US"/>
+              <a:rPr lang="en-US" dirty="0"/>
               <a:t>Second level</a:t>
             </a:r>
           </a:p>
           <a:p>
             <a:pPr lvl="2"/>
             <a:r>
-              <a:rPr lang="en-US"/>
+              <a:rPr lang="en-US" dirty="0"/>
               <a:t>Third level</a:t>
             </a:r>
           </a:p>
           <a:p>
             <a:pPr lvl="3"/>
             <a:r>
-              <a:rPr lang="en-US"/>
+              <a:rPr lang="en-US" dirty="0"/>
               <a:t>Fourth level</a:t>
             </a:r>
           </a:p>
           <a:p>
             <a:pPr lvl="4"/>
             <a:r>
-              <a:rPr lang="en-US"/>
+              <a:rPr lang="en-US" dirty="0"/>
               <a:t>Fifth level</a:t>
             </a:r>
           </a:p>
@@ -3838,7 +3838,7 @@
           </a:bodyPr>
           <a:lstStyle>
             <a:lvl1pPr algn="l">
-              <a:defRPr sz="4000"/>
+              <a:defRPr sz="3600"/>
             </a:lvl1pPr>
           </a:lstStyle>
           <a:p>
@@ -3866,53 +3866,53 @@
           </a:bodyPr>
           <a:lstStyle>
             <a:lvl1pPr>
-              <a:defRPr sz="2800"/>
+              <a:defRPr sz="2400"/>
             </a:lvl1pPr>
             <a:lvl2pPr>
-              <a:defRPr sz="2400"/>
+              <a:defRPr sz="2000"/>
             </a:lvl2pPr>
             <a:lvl3pPr>
-              <a:defRPr sz="2000"/>
+              <a:defRPr sz="1800"/>
             </a:lvl3pPr>
             <a:lvl4pPr>
-              <a:defRPr sz="1800"/>
+              <a:defRPr sz="1600"/>
             </a:lvl4pPr>
             <a:lvl5pPr>
-              <a:defRPr sz="1800"/>
+              <a:defRPr sz="1600"/>
             </a:lvl5pPr>
           </a:lstStyle>
           <a:p>
             <a:pPr lvl="0"/>
             <a:r>
-              <a:rPr lang="en-US"/>
+              <a:rPr lang="en-US" dirty="0"/>
               <a:t>Click to edit Master text styles</a:t>
             </a:r>
           </a:p>
           <a:p>
             <a:pPr lvl="1"/>
             <a:r>
-              <a:rPr lang="en-US"/>
+              <a:rPr lang="en-US" dirty="0"/>
               <a:t>Second level</a:t>
             </a:r>
           </a:p>
           <a:p>
             <a:pPr lvl="2"/>
             <a:r>
-              <a:rPr lang="en-US"/>
+              <a:rPr lang="en-US" dirty="0"/>
               <a:t>Third level</a:t>
             </a:r>
           </a:p>
           <a:p>
             <a:pPr lvl="3"/>
             <a:r>
-              <a:rPr lang="en-US"/>
+              <a:rPr lang="en-US" dirty="0"/>
               <a:t>Fourth level</a:t>
             </a:r>
           </a:p>
           <a:p>
             <a:pPr lvl="4"/>
             <a:r>
-              <a:rPr lang="en-US"/>
+              <a:rPr lang="en-US" dirty="0"/>
               <a:t>Fifth level</a:t>
             </a:r>
           </a:p>
@@ -5143,35 +5143,35 @@
           <a:p>
             <a:pPr lvl="0"/>
             <a:r>
-              <a:rPr lang="en-US"/>
+              <a:rPr lang="en-US" dirty="0"/>
               <a:t>Click to edit Master text styles</a:t>
             </a:r>
           </a:p>
           <a:p>
             <a:pPr lvl="1"/>
             <a:r>
-              <a:rPr lang="en-US"/>
+              <a:rPr lang="en-US" dirty="0"/>
               <a:t>Second level</a:t>
             </a:r>
           </a:p>
           <a:p>
             <a:pPr lvl="2"/>
             <a:r>
-              <a:rPr lang="en-US"/>
+              <a:rPr lang="en-US" dirty="0"/>
               <a:t>Third level</a:t>
             </a:r>
           </a:p>
           <a:p>
             <a:pPr lvl="3"/>
             <a:r>
-              <a:rPr lang="en-US"/>
+              <a:rPr lang="en-US" dirty="0"/>
               <a:t>Fourth level</a:t>
             </a:r>
           </a:p>
           <a:p>
             <a:pPr lvl="4"/>
             <a:r>
-              <a:rPr lang="en-US"/>
+              <a:rPr lang="en-US" dirty="0"/>
               <a:t>Fifth level</a:t>
             </a:r>
           </a:p>
@@ -5322,12 +5322,12 @@
   </p:sldLayoutIdLst>
   <p:txStyles>
     <p:titleStyle>
-      <a:lvl1pPr algn="ctr" defTabSz="457200" rtl="0" eaLnBrk="1" latinLnBrk="0" hangingPunct="1">
+      <a:lvl1pPr algn="l" defTabSz="457200" rtl="0" eaLnBrk="1" latinLnBrk="0" hangingPunct="1">
         <a:spcBef>
           <a:spcPct val="0"/>
         </a:spcBef>
         <a:buNone/>
-        <a:defRPr sz="4000" kern="1200">
+        <a:defRPr sz="3600" kern="1200">
           <a:solidFill>
             <a:schemeClr val="tx1"/>
           </a:solidFill>
@@ -5344,7 +5344,7 @@
         </a:spcBef>
         <a:buFont typeface="Arial"/>
         <a:buChar char="•"/>
-        <a:defRPr sz="2800" kern="1200">
+        <a:defRPr sz="2000" kern="1200">
           <a:solidFill>
             <a:schemeClr val="tx1"/>
           </a:solidFill>
@@ -5359,7 +5359,7 @@
         </a:spcBef>
         <a:buFont typeface="Arial"/>
         <a:buChar char="–"/>
-        <a:defRPr sz="2400" kern="1200">
+        <a:defRPr sz="1800" kern="1200">
           <a:solidFill>
             <a:schemeClr val="tx1"/>
           </a:solidFill>
@@ -5374,7 +5374,7 @@
         </a:spcBef>
         <a:buFont typeface="Arial"/>
         <a:buChar char="•"/>
-        <a:defRPr sz="2000" kern="1200">
+        <a:defRPr sz="1600" kern="1200">
           <a:solidFill>
             <a:schemeClr val="tx1"/>
           </a:solidFill>
@@ -5389,7 +5389,7 @@
         </a:spcBef>
         <a:buFont typeface="Arial"/>
         <a:buChar char="–"/>
-        <a:defRPr sz="1800" kern="1200">
+        <a:defRPr sz="1400" kern="1200">
           <a:solidFill>
             <a:schemeClr val="tx1"/>
           </a:solidFill>
@@ -5404,7 +5404,7 @@
         </a:spcBef>
         <a:buFont typeface="Arial"/>
         <a:buChar char="»"/>
-        <a:defRPr sz="1800" kern="1200">
+        <a:defRPr sz="1400" kern="1200">
           <a:solidFill>
             <a:schemeClr val="tx1"/>
           </a:solidFill>
@@ -6519,18 +6519,18 @@
 </file>
 
 <file path=customXml/item2.xml><?xml version="1.0" encoding="utf-8"?>
+<p:properties xmlns:p="http://schemas.microsoft.com/office/2006/metadata/properties" xmlns:xsi="http://www.w3.org/2001/XMLSchema-instance" xmlns:pc="http://schemas.microsoft.com/office/infopath/2007/PartnerControls">
+  <documentManagement/>
+</p:properties>
+</file>
+
+<file path=customXml/item3.xml><?xml version="1.0" encoding="utf-8"?>
 <?mso-contentType ?>
 <FormTemplates xmlns="http://schemas.microsoft.com/sharepoint/v3/contenttype/forms">
   <Display>DocumentLibraryForm</Display>
   <Edit>DocumentLibraryForm</Edit>
   <New>DocumentLibraryForm</New>
 </FormTemplates>
-</file>
-
-<file path=customXml/item3.xml><?xml version="1.0" encoding="utf-8"?>
-<p:properties xmlns:p="http://schemas.microsoft.com/office/2006/metadata/properties" xmlns:xsi="http://www.w3.org/2001/XMLSchema-instance" xmlns:pc="http://schemas.microsoft.com/office/infopath/2007/PartnerControls">
-  <documentManagement/>
-</p:properties>
 </file>
 
 <file path=customXml/item4.xml><?xml version="1.0" encoding="utf-8"?>
@@ -6672,7 +6672,7 @@
 </file>
 
 <file path=customXml/itemProps1.xml><?xml version="1.0" encoding="utf-8"?>
-<ds:datastoreItem xmlns:ds="http://schemas.openxmlformats.org/officeDocument/2006/customXml" ds:itemID="{10BB2122-50FB-4777-8728-D52F7CF1AED8}">
+<ds:datastoreItem xmlns:ds="http://schemas.openxmlformats.org/officeDocument/2006/customXml" ds:itemID="{EC3F7911-CA70-450D-9C74-276FAE63B2A1}">
   <ds:schemaRefs>
     <ds:schemaRef ds:uri="4d118d9b-448c-4a54-90d4-6d126d04e28f"/>
     <ds:schemaRef ds:uri="http://purl.org/dc/elements/1.1/"/>
@@ -6690,14 +6690,6 @@
 </file>
 
 <file path=customXml/itemProps2.xml><?xml version="1.0" encoding="utf-8"?>
-<ds:datastoreItem xmlns:ds="http://schemas.openxmlformats.org/officeDocument/2006/customXml" ds:itemID="{4635B0D5-FB81-4068-AEC4-E15905E3EFEE}">
-  <ds:schemaRefs>
-    <ds:schemaRef ds:uri="http://schemas.microsoft.com/sharepoint/v3/contenttype/forms"/>
-  </ds:schemaRefs>
-</ds:datastoreItem>
-</file>
-
-<file path=customXml/itemProps3.xml><?xml version="1.0" encoding="utf-8"?>
 <ds:datastoreItem xmlns:ds="http://schemas.openxmlformats.org/officeDocument/2006/customXml" ds:itemID="{9D39D6F7-DEC6-43E0-B150-2B295957F91D}">
   <ds:schemaRefs>
     <ds:schemaRef ds:uri="http://schemas.microsoft.com/office/2006/metadata/properties"/>
@@ -6706,8 +6698,16 @@
 </ds:datastoreItem>
 </file>
 
+<file path=customXml/itemProps3.xml><?xml version="1.0" encoding="utf-8"?>
+<ds:datastoreItem xmlns:ds="http://schemas.openxmlformats.org/officeDocument/2006/customXml" ds:itemID="{4635B0D5-FB81-4068-AEC4-E15905E3EFEE}">
+  <ds:schemaRefs>
+    <ds:schemaRef ds:uri="http://schemas.microsoft.com/sharepoint/v3/contenttype/forms"/>
+  </ds:schemaRefs>
+</ds:datastoreItem>
+</file>
+
 <file path=customXml/itemProps4.xml><?xml version="1.0" encoding="utf-8"?>
-<ds:datastoreItem xmlns:ds="http://schemas.openxmlformats.org/officeDocument/2006/customXml" ds:itemID="{EC3F7911-CA70-450D-9C74-276FAE63B2A1}">
+<ds:datastoreItem xmlns:ds="http://schemas.openxmlformats.org/officeDocument/2006/customXml" ds:itemID="{10BB2122-50FB-4777-8728-D52F7CF1AED8}">
   <ds:schemaRefs>
     <ds:schemaRef ds:uri="4d118d9b-448c-4a54-90d4-6d126d04e28f"/>
     <ds:schemaRef ds:uri="http://purl.org/dc/elements/1.1/"/>

</xml_diff>